<commit_message>
Update Bloc 3 - Intro
</commit_message>
<xml_diff>
--- a/outils_numeriques/b0_intro/B0_0_Outils_Methodes.pptx
+++ b/outils_numeriques/b0_intro/B0_0_Outils_Methodes.pptx
@@ -6093,7 +6093,7 @@
                 <a:latin typeface="Trebuchet MS"/>
                 <a:ea typeface="Trebuchet MS"/>
               </a:rPr>
-              <a:t>Traitement de données 1D</a:t>
+              <a:t>Traitement de données 2D</a:t>
             </a:r>
             <a:endParaRPr lang="fr-FR" sz="2000" b="0" strike="noStrike" spc="-1" dirty="0">
               <a:latin typeface="Arial"/>
@@ -6165,7 +6165,7 @@
                 <a:latin typeface="Trebuchet MS"/>
                 <a:ea typeface="Trebuchet MS"/>
               </a:rPr>
-              <a:t>Traitement de données 2D</a:t>
+              <a:t>Traitement de données 1D</a:t>
             </a:r>
             <a:endParaRPr lang="fr-FR" sz="2000" b="0" strike="noStrike" spc="-1" dirty="0">
               <a:latin typeface="Arial"/>
@@ -6436,7 +6436,7 @@
         <p:spPr>
           <a:xfrm>
             <a:off x="7300845" y="4275189"/>
-            <a:ext cx="3464226" cy="584775"/>
+            <a:ext cx="3464226" cy="830997"/>
           </a:xfrm>
           <a:prstGeom prst="rect">
             <a:avLst/>
@@ -6455,7 +6455,7 @@
             </a:r>
             <a:r>
               <a:rPr lang="fr-FR" sz="1600" dirty="0"/>
-              <a:t> : signal modulé en amplitude / acquisition numérique</a:t>
+              <a:t> : images d’un faisceau LASER en différents points d’un chemin optique</a:t>
             </a:r>
           </a:p>
         </p:txBody>
@@ -6475,7 +6475,7 @@
         <p:spPr>
           <a:xfrm>
             <a:off x="7300845" y="5669945"/>
-            <a:ext cx="3464226" cy="830997"/>
+            <a:ext cx="3464226" cy="584775"/>
           </a:xfrm>
           <a:prstGeom prst="rect">
             <a:avLst/>
@@ -6494,7 +6494,7 @@
             </a:r>
             <a:r>
               <a:rPr lang="fr-FR" sz="1600" dirty="0"/>
-              <a:t> : images d’un faisceau LASER en différents points d’un chemin optique</a:t>
+              <a:t> : signal modulé en amplitude / acquisition numérique</a:t>
             </a:r>
           </a:p>
         </p:txBody>

</xml_diff>